<commit_message>
ref: add github link
</commit_message>
<xml_diff>
--- a/00-Info/Orga.pptx
+++ b/00-Info/Orga.pptx
@@ -2795,7 +2795,7 @@
           <p:cNvPr id="4" name="Titel 3">
             <a:extLst>
               <a:ext uri="{FF2B5EF4-FFF2-40B4-BE49-F238E27FC236}">
-                <a16:creationId xmlns:a16="http://schemas.microsoft.com/office/drawing/2014/main" xmlns="" id="{86A4D93A-4A7A-406E-B919-36CA0765F9D0}"/>
+                <a16:creationId xmlns="" xmlns:a16="http://schemas.microsoft.com/office/drawing/2014/main" id="{86A4D93A-4A7A-406E-B919-36CA0765F9D0}"/>
               </a:ext>
             </a:extLst>
           </p:cNvPr>
@@ -2824,7 +2824,7 @@
           <p:cNvPr id="5" name="Inhaltsplatzhalter 4">
             <a:extLst>
               <a:ext uri="{FF2B5EF4-FFF2-40B4-BE49-F238E27FC236}">
-                <a16:creationId xmlns:a16="http://schemas.microsoft.com/office/drawing/2014/main" xmlns="" id="{C6E461FB-F032-4443-9B8D-5C4D9B932CD7}"/>
+                <a16:creationId xmlns="" xmlns:a16="http://schemas.microsoft.com/office/drawing/2014/main" id="{C6E461FB-F032-4443-9B8D-5C4D9B932CD7}"/>
               </a:ext>
             </a:extLst>
           </p:cNvPr>
@@ -2857,20 +2857,18 @@
           </a:p>
           <a:p>
             <a:r>
-              <a:rPr lang="de-DE" dirty="0"/>
+              <a:rPr lang="de-DE" dirty="0" smtClean="0"/>
               <a:t>Selbststudium</a:t>
             </a:r>
           </a:p>
           <a:p>
             <a:r>
-              <a:rPr lang="de-DE" dirty="0"/>
-              <a:t>Folien in der Community</a:t>
-            </a:r>
-          </a:p>
-          <a:p>
-            <a:r>
-              <a:rPr lang="de-DE" dirty="0"/>
-              <a:t>Übungen GitHub/</a:t>
+              <a:rPr lang="de-DE" dirty="0" smtClean="0"/>
+              <a:t>Übungen </a:t>
+            </a:r>
+            <a:r>
+              <a:rPr lang="de-DE" dirty="0"/>
+              <a:t>GitHub/</a:t>
             </a:r>
             <a:r>
               <a:rPr lang="de-DE" dirty="0" err="1"/>
@@ -2908,9 +2906,42 @@
             <a:pPr lvl="1"/>
             <a:r>
               <a:rPr lang="de-DE" dirty="0"/>
-              <a:t>Abfrage von Übungsthemen!</a:t>
-            </a:r>
-            <a:endParaRPr lang="en-US" dirty="0"/>
+              <a:t>Abfrage von Übungsthemen</a:t>
+            </a:r>
+            <a:r>
+              <a:rPr lang="de-DE" dirty="0" smtClean="0"/>
+              <a:t>!</a:t>
+            </a:r>
+          </a:p>
+          <a:p>
+            <a:pPr lvl="1"/>
+            <a:endParaRPr lang="de-DE" dirty="0"/>
+          </a:p>
+          <a:p>
+            <a:r>
+              <a:rPr lang="en-US" dirty="0" err="1" smtClean="0"/>
+              <a:t>Unterlagen</a:t>
+            </a:r>
+            <a:r>
+              <a:rPr lang="en-US" dirty="0"/>
+              <a:t>: </a:t>
+            </a:r>
+            <a:r>
+              <a:rPr lang="en-US" dirty="0">
+                <a:hlinkClick r:id="rId2"/>
+              </a:rPr>
+              <a:t>https://hsro-inf-mis.github.io</a:t>
+            </a:r>
+            <a:r>
+              <a:rPr lang="en-US" dirty="0" smtClean="0">
+                <a:hlinkClick r:id="rId2"/>
+              </a:rPr>
+              <a:t>/</a:t>
+            </a:r>
+            <a:endParaRPr lang="en-US" dirty="0" smtClean="0"/>
+          </a:p>
+          <a:p>
+            <a:endParaRPr lang="de-DE" dirty="0" smtClean="0"/>
           </a:p>
         </p:txBody>
       </p:sp>
@@ -2956,7 +2987,7 @@
           <p:cNvPr id="4" name="Titel 3">
             <a:extLst>
               <a:ext uri="{FF2B5EF4-FFF2-40B4-BE49-F238E27FC236}">
-                <a16:creationId xmlns:a16="http://schemas.microsoft.com/office/drawing/2014/main" xmlns="" id="{4C9E9080-A258-46B0-8B64-3111C7F79916}"/>
+                <a16:creationId xmlns="" xmlns:a16="http://schemas.microsoft.com/office/drawing/2014/main" id="{4C9E9080-A258-46B0-8B64-3111C7F79916}"/>
               </a:ext>
             </a:extLst>
           </p:cNvPr>
@@ -2985,7 +3016,7 @@
           <p:cNvPr id="5" name="Inhaltsplatzhalter 4">
             <a:extLst>
               <a:ext uri="{FF2B5EF4-FFF2-40B4-BE49-F238E27FC236}">
-                <a16:creationId xmlns:a16="http://schemas.microsoft.com/office/drawing/2014/main" xmlns="" id="{1DD06ADF-F136-4E39-9E31-EF9B1C4D75B0}"/>
+                <a16:creationId xmlns="" xmlns:a16="http://schemas.microsoft.com/office/drawing/2014/main" id="{1DD06ADF-F136-4E39-9E31-EF9B1C4D75B0}"/>
               </a:ext>
             </a:extLst>
           </p:cNvPr>
@@ -3198,7 +3229,7 @@
           <p:cNvPr id="4" name="Titel 3">
             <a:extLst>
               <a:ext uri="{FF2B5EF4-FFF2-40B4-BE49-F238E27FC236}">
-                <a16:creationId xmlns:a16="http://schemas.microsoft.com/office/drawing/2014/main" xmlns="" id="{EF087996-2284-4C73-BBBC-8DE1C1AE257F}"/>
+                <a16:creationId xmlns="" xmlns:a16="http://schemas.microsoft.com/office/drawing/2014/main" id="{EF087996-2284-4C73-BBBC-8DE1C1AE257F}"/>
               </a:ext>
             </a:extLst>
           </p:cNvPr>
@@ -3243,7 +3274,7 @@
           <p:cNvPr id="5" name="Inhaltsplatzhalter 4">
             <a:extLst>
               <a:ext uri="{FF2B5EF4-FFF2-40B4-BE49-F238E27FC236}">
-                <a16:creationId xmlns:a16="http://schemas.microsoft.com/office/drawing/2014/main" xmlns="" id="{C32D2FAC-8C50-46F6-A94C-4BF86A6BBA74}"/>
+                <a16:creationId xmlns="" xmlns:a16="http://schemas.microsoft.com/office/drawing/2014/main" id="{C32D2FAC-8C50-46F6-A94C-4BF86A6BBA74}"/>
               </a:ext>
             </a:extLst>
           </p:cNvPr>
@@ -3400,7 +3431,7 @@
           <p:cNvPr id="4" name="Titel 3">
             <a:extLst>
               <a:ext uri="{FF2B5EF4-FFF2-40B4-BE49-F238E27FC236}">
-                <a16:creationId xmlns:a16="http://schemas.microsoft.com/office/drawing/2014/main" xmlns="" id="{5AD95E26-C996-4FBF-BF13-1BF356585995}"/>
+                <a16:creationId xmlns="" xmlns:a16="http://schemas.microsoft.com/office/drawing/2014/main" id="{5AD95E26-C996-4FBF-BF13-1BF356585995}"/>
               </a:ext>
             </a:extLst>
           </p:cNvPr>
@@ -3428,7 +3459,7 @@
           <p:cNvPr id="5" name="Inhaltsplatzhalter 4">
             <a:extLst>
               <a:ext uri="{FF2B5EF4-FFF2-40B4-BE49-F238E27FC236}">
-                <a16:creationId xmlns:a16="http://schemas.microsoft.com/office/drawing/2014/main" xmlns="" id="{2DFEEAFD-07A1-449B-9830-8E431D91A150}"/>
+                <a16:creationId xmlns="" xmlns:a16="http://schemas.microsoft.com/office/drawing/2014/main" id="{2DFEEAFD-07A1-449B-9830-8E431D91A150}"/>
               </a:ext>
             </a:extLst>
           </p:cNvPr>

</xml_diff>

<commit_message>
Added profile slide about me
</commit_message>
<xml_diff>
--- a/00-Info/Orga.pptx
+++ b/00-Info/Orga.pptx
@@ -222,7 +222,7 @@
           <a:p>
             <a:fld id="{852105B6-D441-4EC0-9FA7-CF26CD0B8EA0}" type="datetimeFigureOut">
               <a:rPr lang="en-US" smtClean="0"/>
-              <a:t>10/2/17</a:t>
+              <a:t>10/3/2017</a:t>
             </a:fld>
             <a:endParaRPr lang="en-US"/>
           </a:p>
@@ -2763,13 +2763,6 @@
   <p:clrMapOvr>
     <a:masterClrMapping/>
   </p:clrMapOvr>
-  <p:timing>
-    <p:tnLst>
-      <p:par>
-        <p:cTn id="1" dur="indefinite" restart="never" nodeType="tmRoot"/>
-      </p:par>
-    </p:tnLst>
-  </p:timing>
 </p:sld>
 </file>
 
@@ -2795,7 +2788,7 @@
           <p:cNvPr id="4" name="Titel 3">
             <a:extLst>
               <a:ext uri="{FF2B5EF4-FFF2-40B4-BE49-F238E27FC236}">
-                <a16:creationId xmlns="" xmlns:a16="http://schemas.microsoft.com/office/drawing/2014/main" id="{86A4D93A-4A7A-406E-B919-36CA0765F9D0}"/>
+                <a16:creationId xmlns:a16="http://schemas.microsoft.com/office/drawing/2014/main" id="{86A4D93A-4A7A-406E-B919-36CA0765F9D0}"/>
               </a:ext>
             </a:extLst>
           </p:cNvPr>
@@ -2824,7 +2817,7 @@
           <p:cNvPr id="5" name="Inhaltsplatzhalter 4">
             <a:extLst>
               <a:ext uri="{FF2B5EF4-FFF2-40B4-BE49-F238E27FC236}">
-                <a16:creationId xmlns="" xmlns:a16="http://schemas.microsoft.com/office/drawing/2014/main" id="{C6E461FB-F032-4443-9B8D-5C4D9B932CD7}"/>
+                <a16:creationId xmlns:a16="http://schemas.microsoft.com/office/drawing/2014/main" id="{C6E461FB-F032-4443-9B8D-5C4D9B932CD7}"/>
               </a:ext>
             </a:extLst>
           </p:cNvPr>
@@ -2857,18 +2850,14 @@
           </a:p>
           <a:p>
             <a:r>
-              <a:rPr lang="de-DE" dirty="0" smtClean="0"/>
+              <a:rPr lang="de-DE" dirty="0"/>
               <a:t>Selbststudium</a:t>
             </a:r>
           </a:p>
           <a:p>
             <a:r>
-              <a:rPr lang="de-DE" dirty="0" smtClean="0"/>
-              <a:t>Übungen </a:t>
-            </a:r>
-            <a:r>
-              <a:rPr lang="de-DE" dirty="0"/>
-              <a:t>GitHub/</a:t>
+              <a:rPr lang="de-DE" dirty="0"/>
+              <a:t>Übungen GitHub/</a:t>
             </a:r>
             <a:r>
               <a:rPr lang="de-DE" dirty="0" err="1"/>
@@ -2906,11 +2895,7 @@
             <a:pPr lvl="1"/>
             <a:r>
               <a:rPr lang="de-DE" dirty="0"/>
-              <a:t>Abfrage von Übungsthemen</a:t>
-            </a:r>
-            <a:r>
-              <a:rPr lang="de-DE" dirty="0" smtClean="0"/>
-              <a:t>!</a:t>
+              <a:t>Abfrage von Übungsthemen!</a:t>
             </a:r>
           </a:p>
           <a:p>
@@ -2919,7 +2904,7 @@
           </a:p>
           <a:p>
             <a:r>
-              <a:rPr lang="en-US" dirty="0" err="1" smtClean="0"/>
+              <a:rPr lang="en-US" dirty="0" err="1"/>
               <a:t>Unterlagen</a:t>
             </a:r>
             <a:r>
@@ -2930,18 +2915,12 @@
               <a:rPr lang="en-US" dirty="0">
                 <a:hlinkClick r:id="rId2"/>
               </a:rPr>
-              <a:t>https://hsro-inf-mis.github.io</a:t>
-            </a:r>
-            <a:r>
-              <a:rPr lang="en-US" dirty="0" smtClean="0">
-                <a:hlinkClick r:id="rId2"/>
-              </a:rPr>
-              <a:t>/</a:t>
-            </a:r>
-            <a:endParaRPr lang="en-US" dirty="0" smtClean="0"/>
-          </a:p>
-          <a:p>
-            <a:endParaRPr lang="de-DE" dirty="0" smtClean="0"/>
+              <a:t>https://hsro-inf-mis.github.io/</a:t>
+            </a:r>
+            <a:endParaRPr lang="en-US" dirty="0"/>
+          </a:p>
+          <a:p>
+            <a:endParaRPr lang="de-DE" dirty="0"/>
           </a:p>
         </p:txBody>
       </p:sp>
@@ -2955,13 +2934,6 @@
   <p:clrMapOvr>
     <a:masterClrMapping/>
   </p:clrMapOvr>
-  <p:timing>
-    <p:tnLst>
-      <p:par>
-        <p:cTn id="1" dur="indefinite" restart="never" nodeType="tmRoot"/>
-      </p:par>
-    </p:tnLst>
-  </p:timing>
 </p:sld>
 </file>
 
@@ -2987,7 +2959,7 @@
           <p:cNvPr id="4" name="Titel 3">
             <a:extLst>
               <a:ext uri="{FF2B5EF4-FFF2-40B4-BE49-F238E27FC236}">
-                <a16:creationId xmlns="" xmlns:a16="http://schemas.microsoft.com/office/drawing/2014/main" id="{4C9E9080-A258-46B0-8B64-3111C7F79916}"/>
+                <a16:creationId xmlns:a16="http://schemas.microsoft.com/office/drawing/2014/main" id="{4C9E9080-A258-46B0-8B64-3111C7F79916}"/>
               </a:ext>
             </a:extLst>
           </p:cNvPr>
@@ -3016,7 +2988,7 @@
           <p:cNvPr id="5" name="Inhaltsplatzhalter 4">
             <a:extLst>
               <a:ext uri="{FF2B5EF4-FFF2-40B4-BE49-F238E27FC236}">
-                <a16:creationId xmlns="" xmlns:a16="http://schemas.microsoft.com/office/drawing/2014/main" id="{1DD06ADF-F136-4E39-9E31-EF9B1C4D75B0}"/>
+                <a16:creationId xmlns:a16="http://schemas.microsoft.com/office/drawing/2014/main" id="{1DD06ADF-F136-4E39-9E31-EF9B1C4D75B0}"/>
               </a:ext>
             </a:extLst>
           </p:cNvPr>
@@ -3229,7 +3201,7 @@
           <p:cNvPr id="4" name="Titel 3">
             <a:extLst>
               <a:ext uri="{FF2B5EF4-FFF2-40B4-BE49-F238E27FC236}">
-                <a16:creationId xmlns="" xmlns:a16="http://schemas.microsoft.com/office/drawing/2014/main" id="{EF087996-2284-4C73-BBBC-8DE1C1AE257F}"/>
+                <a16:creationId xmlns:a16="http://schemas.microsoft.com/office/drawing/2014/main" id="{EF087996-2284-4C73-BBBC-8DE1C1AE257F}"/>
               </a:ext>
             </a:extLst>
           </p:cNvPr>
@@ -3274,7 +3246,7 @@
           <p:cNvPr id="5" name="Inhaltsplatzhalter 4">
             <a:extLst>
               <a:ext uri="{FF2B5EF4-FFF2-40B4-BE49-F238E27FC236}">
-                <a16:creationId xmlns="" xmlns:a16="http://schemas.microsoft.com/office/drawing/2014/main" id="{C32D2FAC-8C50-46F6-A94C-4BF86A6BBA74}"/>
+                <a16:creationId xmlns:a16="http://schemas.microsoft.com/office/drawing/2014/main" id="{C32D2FAC-8C50-46F6-A94C-4BF86A6BBA74}"/>
               </a:ext>
             </a:extLst>
           </p:cNvPr>
@@ -3431,7 +3403,7 @@
           <p:cNvPr id="4" name="Titel 3">
             <a:extLst>
               <a:ext uri="{FF2B5EF4-FFF2-40B4-BE49-F238E27FC236}">
-                <a16:creationId xmlns="" xmlns:a16="http://schemas.microsoft.com/office/drawing/2014/main" id="{5AD95E26-C996-4FBF-BF13-1BF356585995}"/>
+                <a16:creationId xmlns:a16="http://schemas.microsoft.com/office/drawing/2014/main" id="{5AD95E26-C996-4FBF-BF13-1BF356585995}"/>
               </a:ext>
             </a:extLst>
           </p:cNvPr>
@@ -3459,7 +3431,7 @@
           <p:cNvPr id="5" name="Inhaltsplatzhalter 4">
             <a:extLst>
               <a:ext uri="{FF2B5EF4-FFF2-40B4-BE49-F238E27FC236}">
-                <a16:creationId xmlns="" xmlns:a16="http://schemas.microsoft.com/office/drawing/2014/main" id="{2DFEEAFD-07A1-449B-9830-8E431D91A150}"/>
+                <a16:creationId xmlns:a16="http://schemas.microsoft.com/office/drawing/2014/main" id="{2DFEEAFD-07A1-449B-9830-8E431D91A150}"/>
               </a:ext>
             </a:extLst>
           </p:cNvPr>
@@ -3500,14 +3472,13 @@
           </a:p>
           <a:p>
             <a:r>
-              <a:rPr lang="en-US" dirty="0" err="1" smtClean="0"/>
+              <a:rPr lang="en-US" dirty="0" err="1"/>
               <a:t>Git</a:t>
             </a:r>
             <a:r>
-              <a:rPr lang="en-US" dirty="0" smtClean="0"/>
+              <a:rPr lang="en-US" dirty="0"/>
               <a:t> / GitHub</a:t>
             </a:r>
-            <a:endParaRPr lang="en-US" dirty="0"/>
           </a:p>
           <a:p>
             <a:r>
@@ -3532,13 +3503,6 @@
   <p:clrMapOvr>
     <a:masterClrMapping/>
   </p:clrMapOvr>
-  <p:timing>
-    <p:tnLst>
-      <p:par>
-        <p:cTn id="1" dur="indefinite" restart="never" nodeType="tmRoot"/>
-      </p:par>
-    </p:tnLst>
-  </p:timing>
 </p:sld>
 </file>
 
@@ -3575,18 +3539,17 @@
           <a:lstStyle/>
           <a:p>
             <a:r>
-              <a:rPr lang="de-DE" dirty="0" smtClean="0"/>
+              <a:rPr lang="de-DE" dirty="0"/>
               <a:t>Dozenten </a:t>
             </a:r>
             <a:r>
-              <a:rPr lang="mr-IN" dirty="0" smtClean="0"/>
+              <a:rPr lang="mr-IN" dirty="0"/>
               <a:t>–</a:t>
             </a:r>
             <a:r>
-              <a:rPr lang="de-DE" dirty="0" smtClean="0"/>
+              <a:rPr lang="de-DE" dirty="0"/>
               <a:t> Tobias Jonas</a:t>
             </a:r>
-            <a:endParaRPr lang="de-DE" dirty="0"/>
           </a:p>
         </p:txBody>
       </p:sp>
@@ -3606,111 +3569,98 @@
           <a:lstStyle/>
           <a:p>
             <a:r>
-              <a:rPr lang="de-DE" dirty="0" smtClean="0"/>
+              <a:rPr lang="de-DE" dirty="0"/>
               <a:t>Fachinformatiker und Studium der Informatik an der Hochschule Rosenheim</a:t>
             </a:r>
           </a:p>
           <a:p>
-            <a:endParaRPr lang="de-DE" dirty="0" smtClean="0"/>
-          </a:p>
-          <a:p>
-            <a:r>
-              <a:rPr lang="de-DE" dirty="0" smtClean="0"/>
+            <a:endParaRPr lang="de-DE" dirty="0"/>
+          </a:p>
+          <a:p>
+            <a:r>
+              <a:rPr lang="de-DE" dirty="0"/>
               <a:t>2009 </a:t>
             </a:r>
             <a:r>
-              <a:rPr lang="mr-IN" dirty="0" smtClean="0"/>
+              <a:rPr lang="mr-IN" dirty="0"/>
               <a:t>–</a:t>
             </a:r>
             <a:r>
-              <a:rPr lang="de-DE" dirty="0" smtClean="0"/>
+              <a:rPr lang="de-DE" dirty="0"/>
               <a:t> 2013 		Softwareentwickler Kliniken Südostbayern</a:t>
             </a:r>
           </a:p>
           <a:p>
             <a:r>
               <a:rPr lang="de-DE" dirty="0"/>
-              <a:t>s</a:t>
-            </a:r>
-            <a:r>
-              <a:rPr lang="de-DE" dirty="0" smtClean="0"/>
-              <a:t>eit 2013 		Freelancer	</a:t>
-            </a:r>
-            <a:r>
-              <a:rPr lang="de-DE" dirty="0"/>
-              <a:t> </a:t>
-            </a:r>
-            <a:r>
-              <a:rPr lang="de-DE" dirty="0" smtClean="0"/>
-              <a:t>in diverseren Cloud Computing Projekten</a:t>
-            </a:r>
-          </a:p>
-          <a:p>
-            <a:r>
-              <a:rPr lang="de-DE" dirty="0" smtClean="0"/>
+              <a:t>seit 2013 		Freelancer	 in diverseren Cloud Computing Projekten</a:t>
+            </a:r>
+          </a:p>
+          <a:p>
+            <a:r>
+              <a:rPr lang="de-DE" dirty="0"/>
               <a:t>seit 2017		Co-</a:t>
             </a:r>
             <a:r>
-              <a:rPr lang="de-DE" dirty="0" err="1" smtClean="0"/>
+              <a:rPr lang="de-DE" dirty="0" err="1"/>
               <a:t>Founder</a:t>
             </a:r>
             <a:r>
-              <a:rPr lang="de-DE" dirty="0" smtClean="0"/>
+              <a:rPr lang="de-DE" dirty="0"/>
               <a:t> &amp; CEO innFactory</a:t>
             </a:r>
           </a:p>
           <a:p>
-            <a:endParaRPr lang="de-DE" dirty="0" smtClean="0"/>
-          </a:p>
-          <a:p>
-            <a:endParaRPr lang="de-DE" dirty="0" smtClean="0"/>
-          </a:p>
-          <a:p>
-            <a:r>
-              <a:rPr lang="de-DE" dirty="0" smtClean="0"/>
+            <a:endParaRPr lang="de-DE" dirty="0"/>
+          </a:p>
+          <a:p>
+            <a:endParaRPr lang="de-DE" dirty="0"/>
+          </a:p>
+          <a:p>
+            <a:r>
+              <a:rPr lang="de-DE" dirty="0"/>
               <a:t>Passende Spezialisierung während Arbeit und Studium:</a:t>
             </a:r>
           </a:p>
           <a:p>
             <a:pPr lvl="1"/>
             <a:r>
-              <a:rPr lang="de-DE" dirty="0" smtClean="0"/>
+              <a:rPr lang="de-DE" dirty="0"/>
               <a:t>Java EE und Scala Entwicklung</a:t>
             </a:r>
           </a:p>
           <a:p>
             <a:pPr lvl="1"/>
             <a:r>
-              <a:rPr lang="de-DE" dirty="0" err="1" smtClean="0"/>
+              <a:rPr lang="de-DE" dirty="0" err="1"/>
               <a:t>Microservices</a:t>
             </a:r>
             <a:r>
-              <a:rPr lang="de-DE" dirty="0" smtClean="0"/>
+              <a:rPr lang="de-DE" dirty="0"/>
               <a:t> in der Public Cloud</a:t>
             </a:r>
           </a:p>
           <a:p>
             <a:pPr lvl="1"/>
             <a:r>
-              <a:rPr lang="de-DE" dirty="0" err="1" smtClean="0"/>
+              <a:rPr lang="de-DE" dirty="0" err="1"/>
               <a:t>Machine</a:t>
             </a:r>
             <a:r>
-              <a:rPr lang="de-DE" dirty="0" smtClean="0"/>
+              <a:rPr lang="de-DE" dirty="0"/>
               <a:t> Learning Integration (</a:t>
             </a:r>
             <a:r>
-              <a:rPr lang="de-DE" dirty="0" err="1" smtClean="0"/>
+              <a:rPr lang="de-DE" dirty="0" err="1"/>
               <a:t>Microservice</a:t>
             </a:r>
             <a:r>
-              <a:rPr lang="de-DE" dirty="0" smtClean="0"/>
+              <a:rPr lang="de-DE" dirty="0"/>
               <a:t>)</a:t>
             </a:r>
+          </a:p>
+          <a:p>
             <a:endParaRPr lang="de-DE" dirty="0"/>
-          </a:p>
-          <a:p>
-            <a:endParaRPr lang="de-DE" dirty="0" smtClean="0"/>
           </a:p>
           <a:p>
             <a:endParaRPr lang="de-DE" dirty="0"/>
@@ -3757,13 +3707,6 @@
   <p:clrMapOvr>
     <a:masterClrMapping/>
   </p:clrMapOvr>
-  <p:timing>
-    <p:tnLst>
-      <p:par>
-        <p:cTn id="1" dur="indefinite" restart="never" nodeType="tmRoot"/>
-      </p:par>
-    </p:tnLst>
-  </p:timing>
 </p:sld>
 </file>
 
@@ -3800,19 +3743,19 @@
           <a:lstStyle/>
           <a:p>
             <a:r>
-              <a:rPr lang="de-DE" dirty="0" smtClean="0"/>
+              <a:rPr lang="de-DE" dirty="0"/>
               <a:t>Dozenten </a:t>
             </a:r>
             <a:r>
-              <a:rPr lang="mr-IN" dirty="0" smtClean="0"/>
+              <a:rPr lang="mr-IN" dirty="0"/>
               <a:t>–</a:t>
             </a:r>
             <a:r>
-              <a:rPr lang="de-DE" dirty="0" smtClean="0"/>
+              <a:rPr lang="de-DE" dirty="0"/>
               <a:t> Peter </a:t>
             </a:r>
             <a:r>
-              <a:rPr lang="de-DE" dirty="0" err="1" smtClean="0"/>
+              <a:rPr lang="de-DE" dirty="0" err="1"/>
               <a:t>Kurfer</a:t>
             </a:r>
             <a:endParaRPr lang="de-DE" dirty="0"/>
@@ -3834,6 +3777,108 @@
           <a:bodyPr/>
           <a:lstStyle/>
           <a:p>
+            <a:r>
+              <a:rPr lang="de-DE" dirty="0"/>
+              <a:t>Studium der Informatik an der Hochschule Rosenheim</a:t>
+            </a:r>
+          </a:p>
+          <a:p>
+            <a:endParaRPr lang="de-DE" dirty="0"/>
+          </a:p>
+          <a:p>
+            <a:r>
+              <a:rPr lang="de-DE" dirty="0"/>
+              <a:t>Seit 2010 tätig als IT Consultant, Administrator und Entwickler bei verschiedenen Firmen</a:t>
+            </a:r>
+          </a:p>
+          <a:p>
+            <a:endParaRPr lang="de-DE" dirty="0"/>
+          </a:p>
+          <a:p>
+            <a:r>
+              <a:rPr lang="de-DE" dirty="0"/>
+              <a:t>Passende Spezialisierung während Arbeit u. Studium:</a:t>
+            </a:r>
+          </a:p>
+          <a:p>
+            <a:pPr lvl="1"/>
+            <a:r>
+              <a:rPr lang="de-DE" dirty="0"/>
+              <a:t>Unter anderem Java EE u. C#/.NET Entwicklung</a:t>
+            </a:r>
+            <a:endParaRPr lang="en-US" dirty="0"/>
+          </a:p>
+          <a:p>
+            <a:pPr lvl="1"/>
+            <a:r>
+              <a:rPr lang="en-US" dirty="0" err="1"/>
+              <a:t>Automatisierung</a:t>
+            </a:r>
+            <a:r>
+              <a:rPr lang="en-US" dirty="0"/>
+              <a:t> u. </a:t>
+            </a:r>
+            <a:r>
+              <a:rPr lang="en-US" dirty="0" err="1"/>
+              <a:t>Skripting</a:t>
+            </a:r>
+            <a:r>
+              <a:rPr lang="en-US" dirty="0"/>
+              <a:t> (Bash, </a:t>
+            </a:r>
+            <a:r>
+              <a:rPr lang="en-US" dirty="0" err="1"/>
+              <a:t>Powershell</a:t>
+            </a:r>
+            <a:r>
+              <a:rPr lang="en-US" dirty="0"/>
+              <a:t>, Puppet, …)</a:t>
+            </a:r>
+          </a:p>
+          <a:p>
+            <a:pPr lvl="1"/>
+            <a:r>
+              <a:rPr lang="en-US" dirty="0" err="1"/>
+              <a:t>Virtualisierung</a:t>
+            </a:r>
+            <a:r>
+              <a:rPr lang="en-US" dirty="0"/>
+              <a:t> u. </a:t>
+            </a:r>
+            <a:r>
+              <a:rPr lang="en-US" dirty="0" err="1"/>
+              <a:t>Containerisierung</a:t>
+            </a:r>
+            <a:r>
+              <a:rPr lang="en-US" dirty="0"/>
+              <a:t> (VMWare, Xen, Hyper-V, Docker, …)</a:t>
+            </a:r>
+          </a:p>
+          <a:p>
+            <a:pPr lvl="1"/>
+            <a:r>
+              <a:rPr lang="en-US" dirty="0"/>
+              <a:t>Microservice </a:t>
+            </a:r>
+            <a:r>
+              <a:rPr lang="en-US" dirty="0" err="1"/>
+              <a:t>Infrastruktur</a:t>
+            </a:r>
+            <a:endParaRPr lang="en-US" dirty="0"/>
+          </a:p>
+          <a:p>
+            <a:pPr lvl="1"/>
+            <a:r>
+              <a:rPr lang="en-US" dirty="0"/>
+              <a:t>CI/CD</a:t>
+            </a:r>
+          </a:p>
+          <a:p>
+            <a:pPr lvl="1"/>
+            <a:r>
+              <a:rPr lang="en-US" dirty="0"/>
+              <a:t>Authentication/Authorization (OAuth2, OpenID Connect, JWT, …)</a:t>
+            </a:r>
             <a:endParaRPr lang="de-DE" dirty="0"/>
           </a:p>
         </p:txBody>
@@ -3848,13 +3893,6 @@
   <p:clrMapOvr>
     <a:masterClrMapping/>
   </p:clrMapOvr>
-  <p:timing>
-    <p:tnLst>
-      <p:par>
-        <p:cTn id="1" dur="indefinite" restart="never" nodeType="tmRoot"/>
-      </p:par>
-    </p:tnLst>
-  </p:timing>
 </p:sld>
 </file>
 

</xml_diff>